<commit_message>
v2 of final presentation
</commit_message>
<xml_diff>
--- a/pres/final_presentation.pptx
+++ b/pres/final_presentation.pptx
@@ -3720,27 +3720,15 @@
           <a:lstStyle/>
           <a:p>
             <a:r>
-              <a:rPr lang="fr-FR" dirty="0" err="1"/>
-              <a:t>Realtime</a:t>
-            </a:r>
-            <a:r>
-              <a:rPr lang="fr-FR" dirty="0"/>
-              <a:t> </a:t>
-            </a:r>
-            <a:r>
-              <a:rPr lang="fr-FR" dirty="0" err="1"/>
-              <a:t>debugging</a:t>
-            </a:r>
-            <a:r>
-              <a:rPr lang="fr-FR" dirty="0"/>
-              <a:t> of a softcore </a:t>
-            </a:r>
-            <a:r>
-              <a:rPr lang="fr-FR" dirty="0" err="1"/>
+              <a:rPr lang="en-US" noProof="0" dirty="0"/>
+              <a:t>Realtime debugging of a softcore </a:t>
+            </a:r>
+            <a:r>
+              <a:rPr lang="en-US" noProof="0" dirty="0" err="1"/>
               <a:t>OpenRISC</a:t>
             </a:r>
             <a:r>
-              <a:rPr lang="fr-FR" dirty="0"/>
+              <a:rPr lang="en-US" noProof="0" dirty="0"/>
               <a:t> CPU</a:t>
             </a:r>
           </a:p>
@@ -4257,11 +4245,11 @@
             <a:pPr lvl="1"/>
             <a:r>
               <a:rPr lang="fr-FR" dirty="0"/>
-              <a:t>No support for bus </a:t>
-            </a:r>
-            <a:r>
-              <a:rPr lang="fr-FR" dirty="0" err="1"/>
-              <a:t>arbiter</a:t>
+              <a:t>Native BIU has no support for bus </a:t>
+            </a:r>
+            <a:r>
+              <a:rPr lang="fr-FR" dirty="0" err="1"/>
+              <a:t>arbiters</a:t>
             </a:r>
             <a:endParaRPr lang="fr-FR" dirty="0"/>
           </a:p>
@@ -4648,29 +4636,32 @@
               <a:rPr lang="fr-FR" dirty="0">
                 <a:sym typeface="Wingdings" panose="05000000000000000000" pitchFamily="2" charset="2"/>
               </a:rPr>
-              <a:t>Tries </a:t>
+              <a:t>Up to 3 retries </a:t>
             </a:r>
             <a:r>
               <a:rPr lang="fr-FR" dirty="0" err="1">
                 <a:sym typeface="Wingdings" panose="05000000000000000000" pitchFamily="2" charset="2"/>
               </a:rPr>
-              <a:t>again</a:t>
+              <a:t>before</a:t>
             </a:r>
             <a:r>
               <a:rPr lang="fr-FR" dirty="0">
                 <a:sym typeface="Wingdings" panose="05000000000000000000" pitchFamily="2" charset="2"/>
               </a:rPr>
-              <a:t> 3 times if </a:t>
+              <a:t> </a:t>
             </a:r>
             <a:r>
               <a:rPr lang="fr-FR" dirty="0" err="1">
                 <a:sym typeface="Wingdings" panose="05000000000000000000" pitchFamily="2" charset="2"/>
               </a:rPr>
-              <a:t>needed</a:t>
-            </a:r>
-            <a:endParaRPr lang="fr-FR" dirty="0">
-              <a:sym typeface="Wingdings" panose="05000000000000000000" pitchFamily="2" charset="2"/>
-            </a:endParaRPr>
+              <a:t>giving</a:t>
+            </a:r>
+            <a:r>
+              <a:rPr lang="fr-FR" dirty="0">
+                <a:sym typeface="Wingdings" panose="05000000000000000000" pitchFamily="2" charset="2"/>
+              </a:rPr>
+              <a:t> up</a:t>
+            </a:r>
           </a:p>
           <a:p>
             <a:endParaRPr lang="fr-FR" dirty="0">
@@ -5136,22 +5127,22 @@
           </a:p>
           <a:p>
             <a:r>
+              <a:rPr lang="fr-FR" dirty="0">
+                <a:sym typeface="Wingdings" panose="05000000000000000000" pitchFamily="2" charset="2"/>
+              </a:rPr>
+              <a:t>Memory </a:t>
+            </a:r>
+            <a:r>
               <a:rPr lang="fr-FR" dirty="0" err="1">
                 <a:sym typeface="Wingdings" panose="05000000000000000000" pitchFamily="2" charset="2"/>
               </a:rPr>
-              <a:t>Unaligned</a:t>
+              <a:t>alignment</a:t>
             </a:r>
             <a:r>
               <a:rPr lang="fr-FR" dirty="0">
                 <a:sym typeface="Wingdings" panose="05000000000000000000" pitchFamily="2" charset="2"/>
               </a:rPr>
-              <a:t> 32-bit </a:t>
-            </a:r>
-            <a:r>
-              <a:rPr lang="fr-FR" dirty="0" err="1">
-                <a:sym typeface="Wingdings" panose="05000000000000000000" pitchFamily="2" charset="2"/>
-              </a:rPr>
-              <a:t>reads</a:t>
+              <a:t>?</a:t>
             </a:r>
             <a:endParaRPr lang="fr-FR" dirty="0"/>
           </a:p>
@@ -5850,7 +5841,7 @@
             </a:r>
             <a:r>
               <a:rPr lang="fr-FR" dirty="0"/>
-              <a:t> buffer of 4 byte at 0x400</a:t>
+              <a:t> buffer of 4 byte at 0x00000400</a:t>
             </a:r>
           </a:p>
           <a:p>
@@ -6083,6 +6074,101 @@
           </a:prstGeom>
         </p:spPr>
       </p:pic>
+      <p:sp>
+        <p:nvSpPr>
+          <p:cNvPr id="6" name="ZoneTexte 5">
+            <a:extLst>
+              <a:ext uri="{FF2B5EF4-FFF2-40B4-BE49-F238E27FC236}">
+                <a16:creationId xmlns:a16="http://schemas.microsoft.com/office/drawing/2014/main" id="{EBF6AC4F-F654-5618-63FE-0106FBB2ED76}"/>
+              </a:ext>
+            </a:extLst>
+          </p:cNvPr>
+          <p:cNvSpPr txBox="1"/>
+          <p:nvPr/>
+        </p:nvSpPr>
+        <p:spPr>
+          <a:xfrm>
+            <a:off x="6577781" y="6266656"/>
+            <a:ext cx="2094420" cy="369332"/>
+          </a:xfrm>
+          <a:prstGeom prst="rect">
+            <a:avLst/>
+          </a:prstGeom>
+          <a:noFill/>
+        </p:spPr>
+        <p:txBody>
+          <a:bodyPr wrap="none" rtlCol="0">
+            <a:spAutoFit/>
+          </a:bodyPr>
+          <a:lstStyle/>
+          <a:p>
+            <a:r>
+              <a:rPr lang="fr-FR" dirty="0"/>
+              <a:t>CRC </a:t>
+            </a:r>
+            <a:r>
+              <a:rPr lang="fr-FR" dirty="0" err="1"/>
+              <a:t>errors</a:t>
+            </a:r>
+            <a:r>
+              <a:rPr lang="fr-FR" dirty="0"/>
+              <a:t> on </a:t>
+            </a:r>
+            <a:r>
+              <a:rPr lang="fr-FR" dirty="0" err="1"/>
+              <a:t>writes</a:t>
+            </a:r>
+            <a:endParaRPr lang="fr-FR" dirty="0"/>
+          </a:p>
+        </p:txBody>
+      </p:sp>
+      <p:sp>
+        <p:nvSpPr>
+          <p:cNvPr id="7" name="ZoneTexte 6">
+            <a:extLst>
+              <a:ext uri="{FF2B5EF4-FFF2-40B4-BE49-F238E27FC236}">
+                <a16:creationId xmlns:a16="http://schemas.microsoft.com/office/drawing/2014/main" id="{DDBD0BB3-6861-30A8-9BB0-05AA1B4A3490}"/>
+              </a:ext>
+            </a:extLst>
+          </p:cNvPr>
+          <p:cNvSpPr txBox="1"/>
+          <p:nvPr/>
+        </p:nvSpPr>
+        <p:spPr>
+          <a:xfrm>
+            <a:off x="24578" y="5721800"/>
+            <a:ext cx="4288546" cy="369332"/>
+          </a:xfrm>
+          <a:prstGeom prst="rect">
+            <a:avLst/>
+          </a:prstGeom>
+          <a:noFill/>
+        </p:spPr>
+        <p:txBody>
+          <a:bodyPr wrap="none" rtlCol="0">
+            <a:spAutoFit/>
+          </a:bodyPr>
+          <a:lstStyle/>
+          <a:p>
+            <a:r>
+              <a:rPr lang="fr-FR" dirty="0" err="1"/>
+              <a:t>Uploading</a:t>
+            </a:r>
+            <a:r>
+              <a:rPr lang="fr-FR" dirty="0"/>
+              <a:t> a program (</a:t>
+            </a:r>
+            <a:r>
+              <a:rPr lang="fr-FR" dirty="0" err="1"/>
+              <a:t>disabling</a:t>
+            </a:r>
+            <a:r>
+              <a:rPr lang="fr-FR" dirty="0"/>
+              <a:t> CRC checks)</a:t>
+            </a:r>
+          </a:p>
+        </p:txBody>
+      </p:sp>
     </p:spTree>
     <p:extLst>
       <p:ext uri="{BB962C8B-B14F-4D97-AF65-F5344CB8AC3E}">
@@ -6693,114 +6779,36 @@
           <a:lstStyle/>
           <a:p>
             <a:r>
-              <a:rPr lang="fr-FR" strike="sngStrike" dirty="0" err="1"/>
+              <a:rPr lang="fr-FR" dirty="0"/>
+              <a:t>Fix CRC </a:t>
+            </a:r>
+            <a:r>
+              <a:rPr lang="fr-FR" dirty="0" err="1"/>
+              <a:t>errors</a:t>
+            </a:r>
+            <a:r>
+              <a:rPr lang="fr-FR" dirty="0"/>
+              <a:t> due to TDI</a:t>
+            </a:r>
+          </a:p>
+          <a:p>
+            <a:r>
+              <a:rPr lang="fr-FR" dirty="0" err="1"/>
               <a:t>Implement</a:t>
             </a:r>
             <a:r>
-              <a:rPr lang="fr-FR" strike="sngStrike" dirty="0"/>
-              <a:t> the </a:t>
-            </a:r>
-            <a:r>
-              <a:rPr lang="fr-FR" strike="sngStrike" dirty="0" err="1"/>
-              <a:t>OpenOCD</a:t>
-            </a:r>
-            <a:r>
-              <a:rPr lang="fr-FR" strike="sngStrike" dirty="0"/>
-              <a:t> driver</a:t>
-            </a:r>
-          </a:p>
-          <a:p>
-            <a:r>
-              <a:rPr lang="fr-FR" strike="sngStrike" dirty="0"/>
-              <a:t>Fix top-</a:t>
-            </a:r>
-            <a:r>
-              <a:rPr lang="fr-FR" strike="sngStrike" dirty="0" err="1"/>
-              <a:t>level</a:t>
-            </a:r>
-            <a:r>
-              <a:rPr lang="fr-FR" strike="sngStrike" dirty="0"/>
+              <a:rPr lang="fr-FR" dirty="0"/>
+              <a:t> RF BIU &amp; </a:t>
+            </a:r>
+            <a:r>
+              <a:rPr lang="fr-FR" dirty="0" err="1"/>
+              <a:t>give</a:t>
+            </a:r>
+            <a:r>
+              <a:rPr lang="fr-FR" dirty="0"/>
               <a:t> </a:t>
             </a:r>
             <a:r>
-              <a:rPr lang="fr-FR" strike="sngStrike" dirty="0" err="1"/>
-              <a:t>debug</a:t>
-            </a:r>
-            <a:r>
-              <a:rPr lang="fr-FR" strike="sngStrike" dirty="0"/>
-              <a:t> </a:t>
-            </a:r>
-            <a:r>
-              <a:rPr lang="fr-FR" strike="sngStrike" dirty="0" err="1"/>
-              <a:t>controller</a:t>
-            </a:r>
-            <a:endParaRPr lang="fr-FR" strike="sngStrike" dirty="0"/>
-          </a:p>
-          <a:p>
-            <a:r>
-              <a:rPr lang="fr-FR" strike="sngStrike" dirty="0" err="1"/>
-              <a:t>Dummy</a:t>
-            </a:r>
-            <a:r>
-              <a:rPr lang="fr-FR" strike="sngStrike" dirty="0"/>
-              <a:t> memory and </a:t>
-            </a:r>
-            <a:r>
-              <a:rPr lang="fr-FR" strike="sngStrike" dirty="0" err="1"/>
-              <a:t>register</a:t>
-            </a:r>
-            <a:r>
-              <a:rPr lang="fr-FR" strike="sngStrike" dirty="0"/>
-              <a:t> </a:t>
-            </a:r>
-            <a:r>
-              <a:rPr lang="fr-FR" strike="sngStrike" dirty="0" err="1"/>
-              <a:t>reads</a:t>
-            </a:r>
-            <a:endParaRPr lang="fr-FR" strike="sngStrike" dirty="0"/>
-          </a:p>
-          <a:p>
-            <a:r>
-              <a:rPr lang="fr-FR" strike="sngStrike" dirty="0" err="1"/>
-              <a:t>Implement</a:t>
-            </a:r>
-            <a:r>
-              <a:rPr lang="fr-FR" strike="sngStrike" dirty="0"/>
-              <a:t> system bus BIU</a:t>
-            </a:r>
-          </a:p>
-          <a:p>
-            <a:r>
-              <a:rPr lang="fr-FR" dirty="0"/>
-              <a:t>Fix CRC </a:t>
-            </a:r>
-            <a:r>
-              <a:rPr lang="fr-FR" dirty="0" err="1"/>
-              <a:t>errors</a:t>
-            </a:r>
-            <a:r>
-              <a:rPr lang="fr-FR" dirty="0"/>
-              <a:t> due to TDI</a:t>
-            </a:r>
-          </a:p>
-          <a:p>
-            <a:r>
-              <a:rPr lang="fr-FR" dirty="0" err="1"/>
-              <a:t>Implement</a:t>
-            </a:r>
-            <a:r>
-              <a:rPr lang="fr-FR" dirty="0"/>
-              <a:t> RF BIU &amp; </a:t>
-            </a:r>
-            <a:r>
-              <a:rPr lang="fr-FR" dirty="0" err="1"/>
-              <a:t>give</a:t>
-            </a:r>
-            <a:r>
-              <a:rPr lang="fr-FR" dirty="0"/>
-              <a:t> </a:t>
-            </a:r>
-            <a:r>
               <a:rPr lang="fr-FR" dirty="0" err="1"/>
               <a:t>access</a:t>
             </a:r>
@@ -6832,13 +6840,16 @@
             </a:r>
             <a:r>
               <a:rPr lang="fr-FR" dirty="0"/>
-              <a:t> </a:t>
-            </a:r>
-            <a:r>
-              <a:rPr lang="fr-FR" dirty="0" err="1"/>
-              <a:t>execution</a:t>
-            </a:r>
-            <a:endParaRPr lang="fr-FR" dirty="0"/>
+              <a:t> exécution (CPU </a:t>
+            </a:r>
+            <a:r>
+              <a:rPr lang="fr-FR" dirty="0" err="1"/>
+              <a:t>submodule</a:t>
+            </a:r>
+            <a:r>
+              <a:rPr lang="fr-FR" dirty="0"/>
+              <a:t>)</a:t>
+            </a:r>
           </a:p>
           <a:p>
             <a:r>
@@ -6899,281 +6910,6 @@
   <p:clrMapOvr>
     <a:masterClrMapping/>
   </p:clrMapOvr>
-  <p:timing>
-    <p:tnLst>
-      <p:par>
-        <p:cTn id="1" dur="indefinite" restart="never" nodeType="tmRoot">
-          <p:childTnLst>
-            <p:seq concurrent="1" nextAc="seek">
-              <p:cTn id="2" dur="indefinite" nodeType="mainSeq">
-                <p:childTnLst>
-                  <p:par>
-                    <p:cTn id="3" fill="hold">
-                      <p:stCondLst>
-                        <p:cond delay="indefinite"/>
-                      </p:stCondLst>
-                      <p:childTnLst>
-                        <p:par>
-                          <p:cTn id="4" fill="hold">
-                            <p:stCondLst>
-                              <p:cond delay="0"/>
-                            </p:stCondLst>
-                            <p:childTnLst>
-                              <p:par>
-                                <p:cTn id="5" presetID="1" presetClass="entr" presetSubtype="0" fill="hold" nodeType="clickEffect">
-                                  <p:stCondLst>
-                                    <p:cond delay="0"/>
-                                  </p:stCondLst>
-                                  <p:childTnLst>
-                                    <p:set>
-                                      <p:cBhvr>
-                                        <p:cTn id="6" dur="1" fill="hold">
-                                          <p:stCondLst>
-                                            <p:cond delay="0"/>
-                                          </p:stCondLst>
-                                        </p:cTn>
-                                        <p:tgtEl>
-                                          <p:spTgt spid="3">
-                                            <p:txEl>
-                                              <p:pRg st="3" end="3"/>
-                                            </p:txEl>
-                                          </p:spTgt>
-                                        </p:tgtEl>
-                                        <p:attrNameLst>
-                                          <p:attrName>style.visibility</p:attrName>
-                                        </p:attrNameLst>
-                                      </p:cBhvr>
-                                      <p:to>
-                                        <p:strVal val="visible"/>
-                                      </p:to>
-                                    </p:set>
-                                  </p:childTnLst>
-                                </p:cTn>
-                              </p:par>
-                            </p:childTnLst>
-                          </p:cTn>
-                        </p:par>
-                      </p:childTnLst>
-                    </p:cTn>
-                  </p:par>
-                  <p:par>
-                    <p:cTn id="7" fill="hold">
-                      <p:stCondLst>
-                        <p:cond delay="indefinite"/>
-                      </p:stCondLst>
-                      <p:childTnLst>
-                        <p:par>
-                          <p:cTn id="8" fill="hold">
-                            <p:stCondLst>
-                              <p:cond delay="0"/>
-                            </p:stCondLst>
-                            <p:childTnLst>
-                              <p:par>
-                                <p:cTn id="9" presetID="1" presetClass="entr" presetSubtype="0" fill="hold" nodeType="clickEffect">
-                                  <p:stCondLst>
-                                    <p:cond delay="0"/>
-                                  </p:stCondLst>
-                                  <p:childTnLst>
-                                    <p:set>
-                                      <p:cBhvr>
-                                        <p:cTn id="10" dur="1" fill="hold">
-                                          <p:stCondLst>
-                                            <p:cond delay="0"/>
-                                          </p:stCondLst>
-                                        </p:cTn>
-                                        <p:tgtEl>
-                                          <p:spTgt spid="3">
-                                            <p:txEl>
-                                              <p:pRg st="4" end="4"/>
-                                            </p:txEl>
-                                          </p:spTgt>
-                                        </p:tgtEl>
-                                        <p:attrNameLst>
-                                          <p:attrName>style.visibility</p:attrName>
-                                        </p:attrNameLst>
-                                      </p:cBhvr>
-                                      <p:to>
-                                        <p:strVal val="visible"/>
-                                      </p:to>
-                                    </p:set>
-                                  </p:childTnLst>
-                                </p:cTn>
-                              </p:par>
-                            </p:childTnLst>
-                          </p:cTn>
-                        </p:par>
-                      </p:childTnLst>
-                    </p:cTn>
-                  </p:par>
-                  <p:par>
-                    <p:cTn id="11" fill="hold">
-                      <p:stCondLst>
-                        <p:cond delay="indefinite"/>
-                      </p:stCondLst>
-                      <p:childTnLst>
-                        <p:par>
-                          <p:cTn id="12" fill="hold">
-                            <p:stCondLst>
-                              <p:cond delay="0"/>
-                            </p:stCondLst>
-                            <p:childTnLst>
-                              <p:par>
-                                <p:cTn id="13" presetID="1" presetClass="entr" presetSubtype="0" fill="hold" nodeType="clickEffect">
-                                  <p:stCondLst>
-                                    <p:cond delay="0"/>
-                                  </p:stCondLst>
-                                  <p:childTnLst>
-                                    <p:set>
-                                      <p:cBhvr>
-                                        <p:cTn id="14" dur="1" fill="hold">
-                                          <p:stCondLst>
-                                            <p:cond delay="0"/>
-                                          </p:stCondLst>
-                                        </p:cTn>
-                                        <p:tgtEl>
-                                          <p:spTgt spid="3">
-                                            <p:txEl>
-                                              <p:pRg st="5" end="5"/>
-                                            </p:txEl>
-                                          </p:spTgt>
-                                        </p:tgtEl>
-                                        <p:attrNameLst>
-                                          <p:attrName>style.visibility</p:attrName>
-                                        </p:attrNameLst>
-                                      </p:cBhvr>
-                                      <p:to>
-                                        <p:strVal val="visible"/>
-                                      </p:to>
-                                    </p:set>
-                                  </p:childTnLst>
-                                </p:cTn>
-                              </p:par>
-                            </p:childTnLst>
-                          </p:cTn>
-                        </p:par>
-                      </p:childTnLst>
-                    </p:cTn>
-                  </p:par>
-                  <p:par>
-                    <p:cTn id="15" fill="hold">
-                      <p:stCondLst>
-                        <p:cond delay="indefinite"/>
-                      </p:stCondLst>
-                      <p:childTnLst>
-                        <p:par>
-                          <p:cTn id="16" fill="hold">
-                            <p:stCondLst>
-                              <p:cond delay="0"/>
-                            </p:stCondLst>
-                            <p:childTnLst>
-                              <p:par>
-                                <p:cTn id="17" presetID="1" presetClass="entr" presetSubtype="0" fill="hold" nodeType="clickEffect">
-                                  <p:stCondLst>
-                                    <p:cond delay="0"/>
-                                  </p:stCondLst>
-                                  <p:childTnLst>
-                                    <p:set>
-                                      <p:cBhvr>
-                                        <p:cTn id="18" dur="1" fill="hold">
-                                          <p:stCondLst>
-                                            <p:cond delay="0"/>
-                                          </p:stCondLst>
-                                        </p:cTn>
-                                        <p:tgtEl>
-                                          <p:spTgt spid="3">
-                                            <p:txEl>
-                                              <p:pRg st="6" end="6"/>
-                                            </p:txEl>
-                                          </p:spTgt>
-                                        </p:tgtEl>
-                                        <p:attrNameLst>
-                                          <p:attrName>style.visibility</p:attrName>
-                                        </p:attrNameLst>
-                                      </p:cBhvr>
-                                      <p:to>
-                                        <p:strVal val="visible"/>
-                                      </p:to>
-                                    </p:set>
-                                  </p:childTnLst>
-                                </p:cTn>
-                              </p:par>
-                            </p:childTnLst>
-                          </p:cTn>
-                        </p:par>
-                      </p:childTnLst>
-                    </p:cTn>
-                  </p:par>
-                  <p:par>
-                    <p:cTn id="19" fill="hold">
-                      <p:stCondLst>
-                        <p:cond delay="indefinite"/>
-                      </p:stCondLst>
-                      <p:childTnLst>
-                        <p:par>
-                          <p:cTn id="20" fill="hold">
-                            <p:stCondLst>
-                              <p:cond delay="0"/>
-                            </p:stCondLst>
-                            <p:childTnLst>
-                              <p:par>
-                                <p:cTn id="21" presetID="1" presetClass="entr" presetSubtype="0" fill="hold" nodeType="clickEffect">
-                                  <p:stCondLst>
-                                    <p:cond delay="0"/>
-                                  </p:stCondLst>
-                                  <p:childTnLst>
-                                    <p:set>
-                                      <p:cBhvr>
-                                        <p:cTn id="22" dur="1" fill="hold">
-                                          <p:stCondLst>
-                                            <p:cond delay="0"/>
-                                          </p:stCondLst>
-                                        </p:cTn>
-                                        <p:tgtEl>
-                                          <p:spTgt spid="3">
-                                            <p:txEl>
-                                              <p:pRg st="7" end="7"/>
-                                            </p:txEl>
-                                          </p:spTgt>
-                                        </p:tgtEl>
-                                        <p:attrNameLst>
-                                          <p:attrName>style.visibility</p:attrName>
-                                        </p:attrNameLst>
-                                      </p:cBhvr>
-                                      <p:to>
-                                        <p:strVal val="visible"/>
-                                      </p:to>
-                                    </p:set>
-                                  </p:childTnLst>
-                                </p:cTn>
-                              </p:par>
-                            </p:childTnLst>
-                          </p:cTn>
-                        </p:par>
-                      </p:childTnLst>
-                    </p:cTn>
-                  </p:par>
-                </p:childTnLst>
-              </p:cTn>
-              <p:prevCondLst>
-                <p:cond evt="onPrev" delay="0">
-                  <p:tgtEl>
-                    <p:sldTgt/>
-                  </p:tgtEl>
-                </p:cond>
-              </p:prevCondLst>
-              <p:nextCondLst>
-                <p:cond evt="onNext" delay="0">
-                  <p:tgtEl>
-                    <p:sldTgt/>
-                  </p:tgtEl>
-                </p:cond>
-              </p:nextCondLst>
-            </p:seq>
-          </p:childTnLst>
-        </p:cTn>
-      </p:par>
-    </p:tnLst>
-  </p:timing>
 </p:sld>
 </file>
 

</xml_diff>